<commit_message>
Pievienota aizstāvēšanas prezentācija un izlabota kļūda mācību materiālā
</commit_message>
<xml_diff>
--- a/Biežāk lietotās funkcijas darbam ar skatiliskajiem mainīgajiem programmēšanas valodā C++.pptx
+++ b/Biežāk lietotās funkcijas darbam ar skatiliskajiem mainīgajiem programmēšanas valodā C++.pptx
@@ -283,7 +283,7 @@
           <a:p>
             <a:fld id="{AE91E968-B616-4234-87E1-DCC8063DC422}" type="datetimeFigureOut">
               <a:rPr lang="lv-LV" smtClean="0"/>
-              <a:t>16.06.2021</a:t>
+              <a:t>22.06.2021</a:t>
             </a:fld>
             <a:endParaRPr lang="lv-LV" dirty="0"/>
           </a:p>
@@ -453,7 +453,7 @@
           <a:p>
             <a:fld id="{AE91E968-B616-4234-87E1-DCC8063DC422}" type="datetimeFigureOut">
               <a:rPr lang="lv-LV" smtClean="0"/>
-              <a:t>16.06.2021</a:t>
+              <a:t>22.06.2021</a:t>
             </a:fld>
             <a:endParaRPr lang="lv-LV" dirty="0"/>
           </a:p>
@@ -633,7 +633,7 @@
           <a:p>
             <a:fld id="{AE91E968-B616-4234-87E1-DCC8063DC422}" type="datetimeFigureOut">
               <a:rPr lang="lv-LV" smtClean="0"/>
-              <a:t>16.06.2021</a:t>
+              <a:t>22.06.2021</a:t>
             </a:fld>
             <a:endParaRPr lang="lv-LV" dirty="0"/>
           </a:p>
@@ -803,7 +803,7 @@
           <a:p>
             <a:fld id="{AE91E968-B616-4234-87E1-DCC8063DC422}" type="datetimeFigureOut">
               <a:rPr lang="lv-LV" smtClean="0"/>
-              <a:t>16.06.2021</a:t>
+              <a:t>22.06.2021</a:t>
             </a:fld>
             <a:endParaRPr lang="lv-LV" dirty="0"/>
           </a:p>
@@ -1071,7 +1071,7 @@
           <a:p>
             <a:fld id="{AE91E968-B616-4234-87E1-DCC8063DC422}" type="datetimeFigureOut">
               <a:rPr lang="lv-LV" smtClean="0"/>
-              <a:t>16.06.2021</a:t>
+              <a:t>22.06.2021</a:t>
             </a:fld>
             <a:endParaRPr lang="lv-LV" dirty="0"/>
           </a:p>
@@ -1303,7 +1303,7 @@
           <a:p>
             <a:fld id="{AE91E968-B616-4234-87E1-DCC8063DC422}" type="datetimeFigureOut">
               <a:rPr lang="lv-LV" smtClean="0"/>
-              <a:t>16.06.2021</a:t>
+              <a:t>22.06.2021</a:t>
             </a:fld>
             <a:endParaRPr lang="lv-LV" dirty="0"/>
           </a:p>
@@ -1662,7 +1662,7 @@
           <a:p>
             <a:fld id="{AE91E968-B616-4234-87E1-DCC8063DC422}" type="datetimeFigureOut">
               <a:rPr lang="lv-LV" smtClean="0"/>
-              <a:t>16.06.2021</a:t>
+              <a:t>22.06.2021</a:t>
             </a:fld>
             <a:endParaRPr lang="lv-LV" dirty="0"/>
           </a:p>
@@ -1803,7 +1803,7 @@
           <a:p>
             <a:fld id="{AE91E968-B616-4234-87E1-DCC8063DC422}" type="datetimeFigureOut">
               <a:rPr lang="lv-LV" smtClean="0"/>
-              <a:t>16.06.2021</a:t>
+              <a:t>22.06.2021</a:t>
             </a:fld>
             <a:endParaRPr lang="lv-LV" dirty="0"/>
           </a:p>
@@ -1898,7 +1898,7 @@
           <a:p>
             <a:fld id="{AE91E968-B616-4234-87E1-DCC8063DC422}" type="datetimeFigureOut">
               <a:rPr lang="lv-LV" smtClean="0"/>
-              <a:t>16.06.2021</a:t>
+              <a:t>22.06.2021</a:t>
             </a:fld>
             <a:endParaRPr lang="lv-LV" dirty="0"/>
           </a:p>
@@ -2255,7 +2255,7 @@
           <a:p>
             <a:fld id="{AE91E968-B616-4234-87E1-DCC8063DC422}" type="datetimeFigureOut">
               <a:rPr lang="lv-LV" smtClean="0"/>
-              <a:t>16.06.2021</a:t>
+              <a:t>22.06.2021</a:t>
             </a:fld>
             <a:endParaRPr lang="lv-LV" dirty="0"/>
           </a:p>
@@ -2612,7 +2612,7 @@
           <a:p>
             <a:fld id="{AE91E968-B616-4234-87E1-DCC8063DC422}" type="datetimeFigureOut">
               <a:rPr lang="lv-LV" smtClean="0"/>
-              <a:t>16.06.2021</a:t>
+              <a:t>22.06.2021</a:t>
             </a:fld>
             <a:endParaRPr lang="lv-LV" dirty="0"/>
           </a:p>
@@ -2853,7 +2853,7 @@
           <a:p>
             <a:fld id="{AE91E968-B616-4234-87E1-DCC8063DC422}" type="datetimeFigureOut">
               <a:rPr lang="lv-LV" smtClean="0"/>
-              <a:t>16.06.2021</a:t>
+              <a:t>22.06.2021</a:t>
             </a:fld>
             <a:endParaRPr lang="lv-LV" dirty="0"/>
           </a:p>
@@ -4683,8 +4683,17 @@
             </a:r>
             <a:r>
               <a:rPr lang="lv-LV" dirty="0" smtClean="0"/>
-              <a:t> ģenerēs nejaušu skaitli no 0 līdz 5.</a:t>
-            </a:r>
+              <a:t> ģenerēs nejaušu skaitli no 0 </a:t>
+            </a:r>
+            <a:r>
+              <a:rPr lang="lv-LV" smtClean="0"/>
+              <a:t>līdz </a:t>
+            </a:r>
+            <a:r>
+              <a:rPr lang="lv-LV" smtClean="0"/>
+              <a:t>4.</a:t>
+            </a:r>
+            <a:endParaRPr lang="lv-LV" dirty="0" smtClean="0"/>
           </a:p>
           <a:p>
             <a:endParaRPr lang="lv-LV" b="1" i="1" dirty="0"/>

</xml_diff>